<commit_message>
fixed bug in Patch verb demo
</commit_message>
<xml_diff>
--- a/module-1/01-13 Using the PATCH HTTP Request in your API/01-13 Using the PATCH HTTP Request in your API.pptx
+++ b/module-1/01-13 Using the PATCH HTTP Request in your API/01-13 Using the PATCH HTTP Request in your API.pptx
@@ -4153,7 +4153,7 @@
           <a:p>
             <a:fld id="{290AFF2C-59AC-4DF5-98C0-72603EBA3F7F}" type="datetimeFigureOut">
               <a:rPr lang="en-US" smtClean="0"/>
-              <a:t>9/27/2021</a:t>
+              <a:t>9/29/2021</a:t>
             </a:fld>
             <a:endParaRPr lang="en-US"/>
           </a:p>
@@ -4741,7 +4741,7 @@
           <a:p>
             <a:fld id="{E6A1BB1C-CF0D-44A8-AE72-F6F9729EDF37}" type="datetimeFigureOut">
               <a:rPr lang="en-US" smtClean="0"/>
-              <a:t>9/27/2021</a:t>
+              <a:t>9/29/2021</a:t>
             </a:fld>
             <a:endParaRPr lang="en-US"/>
           </a:p>
@@ -4949,7 +4949,7 @@
           <a:p>
             <a:fld id="{E6A1BB1C-CF0D-44A8-AE72-F6F9729EDF37}" type="datetimeFigureOut">
               <a:rPr lang="en-US" smtClean="0"/>
-              <a:t>9/27/2021</a:t>
+              <a:t>9/29/2021</a:t>
             </a:fld>
             <a:endParaRPr lang="en-US"/>
           </a:p>
@@ -5207,7 +5207,7 @@
           <a:p>
             <a:fld id="{E6A1BB1C-CF0D-44A8-AE72-F6F9729EDF37}" type="datetimeFigureOut">
               <a:rPr lang="en-US" smtClean="0"/>
-              <a:t>9/27/2021</a:t>
+              <a:t>9/29/2021</a:t>
             </a:fld>
             <a:endParaRPr lang="en-US"/>
           </a:p>
@@ -5377,7 +5377,7 @@
           <a:p>
             <a:fld id="{E6A1BB1C-CF0D-44A8-AE72-F6F9729EDF37}" type="datetimeFigureOut">
               <a:rPr lang="en-US" smtClean="0"/>
-              <a:t>9/27/2021</a:t>
+              <a:t>9/29/2021</a:t>
             </a:fld>
             <a:endParaRPr lang="en-US"/>
           </a:p>
@@ -5714,7 +5714,7 @@
           <a:p>
             <a:fld id="{E6A1BB1C-CF0D-44A8-AE72-F6F9729EDF37}" type="datetimeFigureOut">
               <a:rPr lang="en-US" smtClean="0"/>
-              <a:t>9/27/2021</a:t>
+              <a:t>9/29/2021</a:t>
             </a:fld>
             <a:endParaRPr lang="en-US"/>
           </a:p>
@@ -5989,7 +5989,7 @@
           <a:p>
             <a:fld id="{E6A1BB1C-CF0D-44A8-AE72-F6F9729EDF37}" type="datetimeFigureOut">
               <a:rPr lang="en-US" smtClean="0"/>
-              <a:t>9/27/2021</a:t>
+              <a:t>9/29/2021</a:t>
             </a:fld>
             <a:endParaRPr lang="en-US"/>
           </a:p>
@@ -6372,7 +6372,7 @@
           <a:p>
             <a:fld id="{E6A1BB1C-CF0D-44A8-AE72-F6F9729EDF37}" type="datetimeFigureOut">
               <a:rPr lang="en-US" smtClean="0"/>
-              <a:t>9/27/2021</a:t>
+              <a:t>9/29/2021</a:t>
             </a:fld>
             <a:endParaRPr lang="en-US"/>
           </a:p>
@@ -6490,7 +6490,7 @@
           <a:p>
             <a:fld id="{E6A1BB1C-CF0D-44A8-AE72-F6F9729EDF37}" type="datetimeFigureOut">
               <a:rPr lang="en-US" smtClean="0"/>
-              <a:t>9/27/2021</a:t>
+              <a:t>9/29/2021</a:t>
             </a:fld>
             <a:endParaRPr lang="en-US"/>
           </a:p>
@@ -6663,7 +6663,7 @@
           <a:p>
             <a:fld id="{E6A1BB1C-CF0D-44A8-AE72-F6F9729EDF37}" type="datetimeFigureOut">
               <a:rPr lang="en-US" smtClean="0"/>
-              <a:t>9/27/2021</a:t>
+              <a:t>9/29/2021</a:t>
             </a:fld>
             <a:endParaRPr lang="en-US"/>
           </a:p>
@@ -7019,7 +7019,7 @@
           <a:p>
             <a:fld id="{E6A1BB1C-CF0D-44A8-AE72-F6F9729EDF37}" type="datetimeFigureOut">
               <a:rPr lang="en-US" smtClean="0"/>
-              <a:t>9/27/2021</a:t>
+              <a:t>9/29/2021</a:t>
             </a:fld>
             <a:endParaRPr lang="en-US"/>
           </a:p>
@@ -7367,7 +7367,7 @@
           <a:p>
             <a:fld id="{E6A1BB1C-CF0D-44A8-AE72-F6F9729EDF37}" type="datetimeFigureOut">
               <a:rPr lang="en-US" smtClean="0"/>
-              <a:t>9/27/2021</a:t>
+              <a:t>9/29/2021</a:t>
             </a:fld>
             <a:endParaRPr lang="en-US"/>
           </a:p>
@@ -7678,7 +7678,7 @@
           <a:p>
             <a:fld id="{E6A1BB1C-CF0D-44A8-AE72-F6F9729EDF37}" type="datetimeFigureOut">
               <a:rPr lang="en-US" smtClean="0"/>
-              <a:t>9/27/2021</a:t>
+              <a:t>9/29/2021</a:t>
             </a:fld>
             <a:endParaRPr lang="en-US"/>
           </a:p>
@@ -8674,9 +8674,10 @@
           <a:lstStyle/>
           <a:p>
             <a:r>
-              <a:rPr lang="en-US" dirty="0"/>
-              <a:t>Documenting your API with OpenAPI</a:t>
+              <a:rPr lang="en-US"/>
+              <a:t>Using the PATCH HTTP Request in your API</a:t>
             </a:r>
+            <a:endParaRPr lang="en-US" dirty="0"/>
           </a:p>
         </p:txBody>
       </p:sp>

</xml_diff>